<commit_message>
Added final presentation as powerpoint, if we decide to update it, do it here. Submittable notebook is Final_Vers_ZP, with supplementary information from ETLwork, DataCleaning_SN, and IMDB_DataFetch&Clean. RawData is located in zippedData folder, with parsed and fixed data located in the Final_Data folder.
</commit_message>
<xml_diff>
--- a/Mod_1_Presentation.pptx
+++ b/Mod_1_Presentation.pptx
@@ -801,7 +801,7 @@
   <p:cSld>
     <p:spTree>
       <p:nvGrpSpPr>
-        <p:cNvPr id="108" name="Shape 108"/>
+        <p:cNvPr id="106" name="Shape 106"/>
         <p:cNvGrpSpPr/>
         <p:nvPr/>
       </p:nvGrpSpPr>
@@ -815,7 +815,7 @@
       </p:grpSpPr>
       <p:sp>
         <p:nvSpPr>
-          <p:cNvPr id="109" name="Google Shape;109;g8e70cf831f_0_29:notes"/>
+          <p:cNvPr id="107" name="Google Shape;107;g8e70cf831f_0_29:notes"/>
           <p:cNvSpPr/>
           <p:nvPr>
             <p:ph idx="2" type="sldImg"/>
@@ -850,7 +850,7 @@
       </p:sp>
       <p:sp>
         <p:nvSpPr>
-          <p:cNvPr id="110" name="Google Shape;110;g8e70cf831f_0_29:notes"/>
+          <p:cNvPr id="108" name="Google Shape;108;g8e70cf831f_0_29:notes"/>
           <p:cNvSpPr txBox="1"/>
           <p:nvPr>
             <p:ph idx="1" type="body"/>
@@ -949,7 +949,7 @@
   <p:cSld>
     <p:spTree>
       <p:nvGrpSpPr>
-        <p:cNvPr id="114" name="Shape 114"/>
+        <p:cNvPr id="112" name="Shape 112"/>
         <p:cNvGrpSpPr/>
         <p:nvPr/>
       </p:nvGrpSpPr>
@@ -963,7 +963,7 @@
       </p:grpSpPr>
       <p:sp>
         <p:nvSpPr>
-          <p:cNvPr id="115" name="Google Shape;115;g8dca1c2c8d_0_36:notes"/>
+          <p:cNvPr id="113" name="Google Shape;113;g8dca1c2c8d_0_36:notes"/>
           <p:cNvSpPr/>
           <p:nvPr>
             <p:ph idx="2" type="sldImg"/>
@@ -998,7 +998,7 @@
       </p:sp>
       <p:sp>
         <p:nvSpPr>
-          <p:cNvPr id="116" name="Google Shape;116;g8dca1c2c8d_0_36:notes"/>
+          <p:cNvPr id="114" name="Google Shape;114;g8dca1c2c8d_0_36:notes"/>
           <p:cNvSpPr txBox="1"/>
           <p:nvPr>
             <p:ph idx="1" type="body"/>
@@ -1081,7 +1081,7 @@
   <p:cSld>
     <p:spTree>
       <p:nvGrpSpPr>
-        <p:cNvPr id="120" name="Shape 120"/>
+        <p:cNvPr id="118" name="Shape 118"/>
         <p:cNvGrpSpPr/>
         <p:nvPr/>
       </p:nvGrpSpPr>
@@ -1095,7 +1095,7 @@
       </p:grpSpPr>
       <p:sp>
         <p:nvSpPr>
-          <p:cNvPr id="121" name="Google Shape;121;g8e70cf831f_0_45:notes"/>
+          <p:cNvPr id="119" name="Google Shape;119;g8e70cf831f_0_45:notes"/>
           <p:cNvSpPr/>
           <p:nvPr>
             <p:ph idx="2" type="sldImg"/>
@@ -1130,7 +1130,7 @@
       </p:sp>
       <p:sp>
         <p:nvSpPr>
-          <p:cNvPr id="122" name="Google Shape;122;g8e70cf831f_0_45:notes"/>
+          <p:cNvPr id="120" name="Google Shape;120;g8e70cf831f_0_45:notes"/>
           <p:cNvSpPr txBox="1"/>
           <p:nvPr>
             <p:ph idx="1" type="body"/>
@@ -1361,6 +1361,38 @@
               <a:buNone/>
             </a:pPr>
             <a:r>
+              <a:rPr lang="en"/>
+              <a:t>Having a successful movie studio will add some things to the microsoft portfolio. Most importantly, profit. A successful movie studio will bring in money. </a:t>
+            </a:r>
+            <a:endParaRPr/>
+          </a:p>
+          <a:p>
+            <a:pPr indent="0" lvl="0" marL="0" rtl="0" algn="l">
+              <a:spcBef>
+                <a:spcPts val="0"/>
+              </a:spcBef>
+              <a:spcAft>
+                <a:spcPts val="0"/>
+              </a:spcAft>
+              <a:buNone/>
+            </a:pPr>
+            <a:r>
+              <a:rPr lang="en"/>
+              <a:t>The other thing is recognition. Just like Marvel and Disney’s names come out when thinking of successful studios. We want our name to also be on that list of “good” studios.</a:t>
+            </a:r>
+            <a:endParaRPr/>
+          </a:p>
+          <a:p>
+            <a:pPr indent="0" lvl="0" marL="0" rtl="0" algn="l">
+              <a:spcBef>
+                <a:spcPts val="0"/>
+              </a:spcBef>
+              <a:spcAft>
+                <a:spcPts val="0"/>
+              </a:spcAft>
+              <a:buNone/>
+            </a:pPr>
+            <a:r>
               <a:t/>
             </a:r>
             <a:endParaRPr/>
@@ -1462,6 +1494,22 @@
             <a:r>
               <a:rPr lang="en"/>
               <a:t>We wanted to see how each genre of movie fared when only compared against itself to see what genre typically results in a movie that creates profit.</a:t>
+            </a:r>
+            <a:endParaRPr/>
+          </a:p>
+          <a:p>
+            <a:pPr indent="0" lvl="0" marL="0" rtl="0" algn="l">
+              <a:spcBef>
+                <a:spcPts val="0"/>
+              </a:spcBef>
+              <a:spcAft>
+                <a:spcPts val="0"/>
+              </a:spcAft>
+              <a:buNone/>
+            </a:pPr>
+            <a:r>
+              <a:rPr lang="en"/>
+              <a:t>We looked at when each genre is released and what seasons or months it does best in. </a:t>
             </a:r>
             <a:endParaRPr/>
           </a:p>
@@ -1853,7 +1901,7 @@
   <p:cSld>
     <p:spTree>
       <p:nvGrpSpPr>
-        <p:cNvPr id="94" name="Shape 94"/>
+        <p:cNvPr id="93" name="Shape 93"/>
         <p:cNvGrpSpPr/>
         <p:nvPr/>
       </p:nvGrpSpPr>
@@ -1867,7 +1915,7 @@
       </p:grpSpPr>
       <p:sp>
         <p:nvSpPr>
-          <p:cNvPr id="95" name="Google Shape;95;g8e70cf831f_0_106:notes"/>
+          <p:cNvPr id="94" name="Google Shape;94;g8e70cf831f_0_106:notes"/>
           <p:cNvSpPr/>
           <p:nvPr>
             <p:ph idx="2" type="sldImg"/>
@@ -1902,7 +1950,7 @@
       </p:sp>
       <p:sp>
         <p:nvSpPr>
-          <p:cNvPr id="96" name="Google Shape;96;g8e70cf831f_0_106:notes"/>
+          <p:cNvPr id="95" name="Google Shape;95;g8e70cf831f_0_106:notes"/>
           <p:cNvSpPr txBox="1"/>
           <p:nvPr>
             <p:ph idx="1" type="body"/>
@@ -1953,7 +2001,7 @@
   <p:cSld>
     <p:spTree>
       <p:nvGrpSpPr>
-        <p:cNvPr id="101" name="Shape 101"/>
+        <p:cNvPr id="99" name="Shape 99"/>
         <p:cNvGrpSpPr/>
         <p:nvPr/>
       </p:nvGrpSpPr>
@@ -1967,7 +2015,7 @@
       </p:grpSpPr>
       <p:sp>
         <p:nvSpPr>
-          <p:cNvPr id="102" name="Google Shape;102;g8e70cf831f_0_111:notes"/>
+          <p:cNvPr id="100" name="Google Shape;100;g8e70cf831f_0_111:notes"/>
           <p:cNvSpPr/>
           <p:nvPr>
             <p:ph idx="2" type="sldImg"/>
@@ -2002,7 +2050,7 @@
       </p:sp>
       <p:sp>
         <p:nvSpPr>
-          <p:cNvPr id="103" name="Google Shape;103;g8e70cf831f_0_111:notes"/>
+          <p:cNvPr id="101" name="Google Shape;101;g8e70cf831f_0_111:notes"/>
           <p:cNvSpPr txBox="1"/>
           <p:nvPr>
             <p:ph idx="1" type="body"/>
@@ -6823,7 +6871,7 @@
   <p:cSld>
     <p:spTree>
       <p:nvGrpSpPr>
-        <p:cNvPr id="111" name="Shape 111"/>
+        <p:cNvPr id="109" name="Shape 109"/>
         <p:cNvGrpSpPr/>
         <p:nvPr/>
       </p:nvGrpSpPr>
@@ -6837,7 +6885,7 @@
       </p:grpSpPr>
       <p:sp>
         <p:nvSpPr>
-          <p:cNvPr id="112" name="Google Shape;112;p22"/>
+          <p:cNvPr id="110" name="Google Shape;110;p22"/>
           <p:cNvSpPr txBox="1"/>
           <p:nvPr>
             <p:ph type="title"/>
@@ -6877,7 +6925,7 @@
       </p:sp>
       <p:sp>
         <p:nvSpPr>
-          <p:cNvPr id="113" name="Google Shape;113;p22"/>
+          <p:cNvPr id="111" name="Google Shape;111;p22"/>
           <p:cNvSpPr txBox="1"/>
           <p:nvPr>
             <p:ph idx="1" type="body"/>
@@ -7038,7 +7086,7 @@
   <p:cSld>
     <p:spTree>
       <p:nvGrpSpPr>
-        <p:cNvPr id="117" name="Shape 117"/>
+        <p:cNvPr id="115" name="Shape 115"/>
         <p:cNvGrpSpPr/>
         <p:nvPr/>
       </p:nvGrpSpPr>
@@ -7052,7 +7100,7 @@
       </p:grpSpPr>
       <p:sp>
         <p:nvSpPr>
-          <p:cNvPr id="118" name="Google Shape;118;p23"/>
+          <p:cNvPr id="116" name="Google Shape;116;p23"/>
           <p:cNvSpPr txBox="1"/>
           <p:nvPr>
             <p:ph type="title"/>
@@ -7092,7 +7140,7 @@
       </p:sp>
       <p:sp>
         <p:nvSpPr>
-          <p:cNvPr id="119" name="Google Shape;119;p23"/>
+          <p:cNvPr id="117" name="Google Shape;117;p23"/>
           <p:cNvSpPr txBox="1"/>
           <p:nvPr>
             <p:ph idx="1" type="body"/>
@@ -7269,7 +7317,7 @@
   <p:cSld>
     <p:spTree>
       <p:nvGrpSpPr>
-        <p:cNvPr id="123" name="Shape 123"/>
+        <p:cNvPr id="121" name="Shape 121"/>
         <p:cNvGrpSpPr/>
         <p:nvPr/>
       </p:nvGrpSpPr>
@@ -7283,7 +7331,7 @@
       </p:grpSpPr>
       <p:sp>
         <p:nvSpPr>
-          <p:cNvPr id="124" name="Google Shape;124;p24"/>
+          <p:cNvPr id="122" name="Google Shape;122;p24"/>
           <p:cNvSpPr txBox="1"/>
           <p:nvPr>
             <p:ph type="ctrTitle"/>
@@ -7323,7 +7371,7 @@
       </p:sp>
       <p:sp>
         <p:nvSpPr>
-          <p:cNvPr id="125" name="Google Shape;125;p24"/>
+          <p:cNvPr id="123" name="Google Shape;123;p24"/>
           <p:cNvSpPr txBox="1"/>
           <p:nvPr>
             <p:ph idx="1" type="subTitle"/>
@@ -7638,13 +7686,45 @@
                 <a:spcPts val="0"/>
               </a:spcBef>
               <a:spcAft>
-                <a:spcPts val="1600"/>
+                <a:spcPts val="0"/>
               </a:spcAft>
               <a:buNone/>
             </a:pPr>
             <a:r>
               <a:rPr lang="en"/>
-              <a:t>Idk what this means</a:t>
+              <a:t>How will this add value to the company?</a:t>
+            </a:r>
+            <a:endParaRPr/>
+          </a:p>
+          <a:p>
+            <a:pPr indent="0" lvl="0" marL="0" rtl="0" algn="l">
+              <a:spcBef>
+                <a:spcPts val="1600"/>
+              </a:spcBef>
+              <a:spcAft>
+                <a:spcPts val="0"/>
+              </a:spcAft>
+              <a:buNone/>
+            </a:pPr>
+            <a:r>
+              <a:rPr lang="en"/>
+              <a:t>	Profit</a:t>
+            </a:r>
+            <a:endParaRPr/>
+          </a:p>
+          <a:p>
+            <a:pPr indent="0" lvl="0" marL="0" rtl="0" algn="l">
+              <a:spcBef>
+                <a:spcPts val="1600"/>
+              </a:spcBef>
+              <a:spcAft>
+                <a:spcPts val="1600"/>
+              </a:spcAft>
+              <a:buNone/>
+            </a:pPr>
+            <a:r>
+              <a:rPr lang="en"/>
+              <a:t>	Name brand recognition</a:t>
             </a:r>
             <a:endParaRPr/>
           </a:p>
@@ -7765,6 +7845,22 @@
             </a:pPr>
             <a:r>
               <a:rPr lang="en"/>
+              <a:t>	Only looked at movies from the last 30 years</a:t>
+            </a:r>
+            <a:endParaRPr/>
+          </a:p>
+          <a:p>
+            <a:pPr indent="0" lvl="0" marL="0" rtl="0" algn="l">
+              <a:spcBef>
+                <a:spcPts val="1600"/>
+              </a:spcBef>
+              <a:spcAft>
+                <a:spcPts val="0"/>
+              </a:spcAft>
+              <a:buNone/>
+            </a:pPr>
+            <a:r>
+              <a:rPr lang="en"/>
               <a:t>	Determined profitability and cost for each genre of film</a:t>
             </a:r>
             <a:endParaRPr/>
@@ -7781,7 +7877,38 @@
             </a:pPr>
             <a:r>
               <a:rPr lang="en"/>
+              <a:t>	Looked at the best release month for each genre</a:t>
+            </a:r>
+            <a:endParaRPr/>
+          </a:p>
+          <a:p>
+            <a:pPr indent="0" lvl="0" marL="0" rtl="0" algn="l">
+              <a:spcBef>
+                <a:spcPts val="1600"/>
+              </a:spcBef>
+              <a:spcAft>
+                <a:spcPts val="0"/>
+              </a:spcAft>
+              <a:buNone/>
+            </a:pPr>
+            <a:r>
+              <a:rPr lang="en"/>
               <a:t>Looked at production values to profit for each genre</a:t>
+            </a:r>
+            <a:endParaRPr/>
+          </a:p>
+          <a:p>
+            <a:pPr indent="0" lvl="0" marL="0" rtl="0" algn="l">
+              <a:spcBef>
+                <a:spcPts val="1600"/>
+              </a:spcBef>
+              <a:spcAft>
+                <a:spcPts val="0"/>
+              </a:spcAft>
+              <a:buNone/>
+            </a:pPr>
+            <a:r>
+              <a:t/>
             </a:r>
             <a:endParaRPr/>
           </a:p>
@@ -8138,48 +8265,9 @@
           </a:p>
         </p:txBody>
       </p:sp>
-      <p:sp>
-        <p:nvSpPr>
-          <p:cNvPr id="92" name="Google Shape;92;p19"/>
-          <p:cNvSpPr txBox="1"/>
-          <p:nvPr>
-            <p:ph idx="1" type="body"/>
-          </p:nvPr>
-        </p:nvSpPr>
-        <p:spPr>
-          <a:xfrm>
-            <a:off x="311700" y="1152475"/>
-            <a:ext cx="8520600" cy="3416400"/>
-          </a:xfrm>
-          <a:prstGeom prst="rect">
-            <a:avLst/>
-          </a:prstGeom>
-        </p:spPr>
-        <p:txBody>
-          <a:bodyPr anchorCtr="0" anchor="t" bIns="91425" lIns="91425" spcFirstLastPara="1" rIns="91425" wrap="square" tIns="91425">
-            <a:noAutofit/>
-          </a:bodyPr>
-          <a:lstStyle/>
-          <a:p>
-            <a:pPr indent="0" lvl="0" marL="0" rtl="0" algn="l">
-              <a:spcBef>
-                <a:spcPts val="0"/>
-              </a:spcBef>
-              <a:spcAft>
-                <a:spcPts val="1600"/>
-              </a:spcAft>
-              <a:buNone/>
-            </a:pPr>
-            <a:r>
-              <a:t/>
-            </a:r>
-            <a:endParaRPr/>
-          </a:p>
-        </p:txBody>
-      </p:sp>
       <p:pic>
         <p:nvPicPr>
-          <p:cNvPr id="93" name="Google Shape;93;p19"/>
+          <p:cNvPr id="92" name="Google Shape;92;p19"/>
           <p:cNvPicPr preferRelativeResize="0"/>
           <p:nvPr/>
         </p:nvPicPr>
@@ -8218,7 +8306,7 @@
   <p:cSld>
     <p:spTree>
       <p:nvGrpSpPr>
-        <p:cNvPr id="97" name="Shape 97"/>
+        <p:cNvPr id="96" name="Shape 96"/>
         <p:cNvGrpSpPr/>
         <p:nvPr/>
       </p:nvGrpSpPr>
@@ -8232,7 +8320,7 @@
       </p:grpSpPr>
       <p:sp>
         <p:nvSpPr>
-          <p:cNvPr id="98" name="Google Shape;98;p20"/>
+          <p:cNvPr id="97" name="Google Shape;97;p20"/>
           <p:cNvSpPr txBox="1"/>
           <p:nvPr>
             <p:ph type="title"/>
@@ -8270,48 +8358,9 @@
           </a:p>
         </p:txBody>
       </p:sp>
-      <p:sp>
-        <p:nvSpPr>
-          <p:cNvPr id="99" name="Google Shape;99;p20"/>
-          <p:cNvSpPr txBox="1"/>
-          <p:nvPr>
-            <p:ph idx="1" type="body"/>
-          </p:nvPr>
-        </p:nvSpPr>
-        <p:spPr>
-          <a:xfrm>
-            <a:off x="311700" y="1152475"/>
-            <a:ext cx="8520600" cy="3416400"/>
-          </a:xfrm>
-          <a:prstGeom prst="rect">
-            <a:avLst/>
-          </a:prstGeom>
-        </p:spPr>
-        <p:txBody>
-          <a:bodyPr anchorCtr="0" anchor="t" bIns="91425" lIns="91425" spcFirstLastPara="1" rIns="91425" wrap="square" tIns="91425">
-            <a:noAutofit/>
-          </a:bodyPr>
-          <a:lstStyle/>
-          <a:p>
-            <a:pPr indent="0" lvl="0" marL="0" rtl="0" algn="l">
-              <a:spcBef>
-                <a:spcPts val="0"/>
-              </a:spcBef>
-              <a:spcAft>
-                <a:spcPts val="1600"/>
-              </a:spcAft>
-              <a:buNone/>
-            </a:pPr>
-            <a:r>
-              <a:t/>
-            </a:r>
-            <a:endParaRPr/>
-          </a:p>
-        </p:txBody>
-      </p:sp>
       <p:pic>
         <p:nvPicPr>
-          <p:cNvPr id="100" name="Google Shape;100;p20"/>
+          <p:cNvPr id="98" name="Google Shape;98;p20"/>
           <p:cNvPicPr preferRelativeResize="0"/>
           <p:nvPr/>
         </p:nvPicPr>
@@ -8325,7 +8374,7 @@
         </p:blipFill>
         <p:spPr>
           <a:xfrm>
-            <a:off x="347663" y="985838"/>
+            <a:off x="347663" y="1062038"/>
             <a:ext cx="8448675" cy="3171825"/>
           </a:xfrm>
           <a:prstGeom prst="rect">
@@ -8350,7 +8399,7 @@
   <p:cSld>
     <p:spTree>
       <p:nvGrpSpPr>
-        <p:cNvPr id="104" name="Shape 104"/>
+        <p:cNvPr id="102" name="Shape 102"/>
         <p:cNvGrpSpPr/>
         <p:nvPr/>
       </p:nvGrpSpPr>
@@ -8364,7 +8413,7 @@
       </p:grpSpPr>
       <p:sp>
         <p:nvSpPr>
-          <p:cNvPr id="105" name="Google Shape;105;p21"/>
+          <p:cNvPr id="103" name="Google Shape;103;p21"/>
           <p:cNvSpPr txBox="1"/>
           <p:nvPr>
             <p:ph type="title"/>
@@ -8404,7 +8453,7 @@
       </p:sp>
       <p:sp>
         <p:nvSpPr>
-          <p:cNvPr id="106" name="Google Shape;106;p21"/>
+          <p:cNvPr id="104" name="Google Shape;104;p21"/>
           <p:cNvSpPr txBox="1"/>
           <p:nvPr>
             <p:ph idx="1" type="body"/>
@@ -8444,7 +8493,7 @@
       </p:sp>
       <p:pic>
         <p:nvPicPr>
-          <p:cNvPr id="107" name="Google Shape;107;p21"/>
+          <p:cNvPr id="105" name="Google Shape;105;p21"/>
           <p:cNvPicPr preferRelativeResize="0"/>
           <p:nvPr/>
         </p:nvPicPr>

</xml_diff>